<commit_message>
Classes e apresentação dos pontos de extensão - @Benchmark - @DisabledOnOS
não apresentar @IntegratedTest
</commit_message>
<xml_diff>
--- a/CAP385-00-Presentations/03-JUnit 5 Arquitetura e Pontos de Extensão/03-JUnit 5 - Arquitetura.pptx
+++ b/CAP385-00-Presentations/03-JUnit 5 Arquitetura e Pontos de Extensão/03-JUnit 5 - Arquitetura.pptx
@@ -1,119 +1,3 @@
-
-<file path=ppt/presentation.xml><?xml version="1.0" encoding="utf-8"?>
-<p:presentation xmlns:a="http://schemas.openxmlformats.org/drawingml/2006/main" xmlns:r="http://schemas.openxmlformats.org/officeDocument/2006/relationships" xmlns:p="http://schemas.openxmlformats.org/presentationml/2006/main" saveSubsetFonts="1">
-  <p:sldMasterIdLst>
-    <p:sldMasterId id="2147483648" r:id="rId1"/>
-  </p:sldMasterIdLst>
-  <p:notesMasterIdLst>
-    <p:notesMasterId r:id="rId8"/>
-  </p:notesMasterIdLst>
-  <p:sldIdLst>
-    <p:sldId id="257" r:id="rId2"/>
-    <p:sldId id="271" r:id="rId3"/>
-    <p:sldId id="288" r:id="rId4"/>
-    <p:sldId id="290" r:id="rId5"/>
-    <p:sldId id="292" r:id="rId6"/>
-    <p:sldId id="291" r:id="rId7"/>
-  </p:sldIdLst>
-  <p:sldSz cx="9144000" cy="6858000" type="screen4x3"/>
-  <p:notesSz cx="6858000" cy="9144000"/>
-  <p:defaultTextStyle>
-    <a:defPPr>
-      <a:defRPr lang="pt-BR"/>
-    </a:defPPr>
-    <a:lvl1pPr marL="0" algn="l" defTabSz="914400" rtl="0" eaLnBrk="1" latinLnBrk="0" hangingPunct="1">
-      <a:defRPr sz="1800" kern="1200">
-        <a:solidFill>
-          <a:schemeClr val="tx1"/>
-        </a:solidFill>
-        <a:latin typeface="+mn-lt"/>
-        <a:ea typeface="+mn-ea"/>
-        <a:cs typeface="+mn-cs"/>
-      </a:defRPr>
-    </a:lvl1pPr>
-    <a:lvl2pPr marL="457200" algn="l" defTabSz="914400" rtl="0" eaLnBrk="1" latinLnBrk="0" hangingPunct="1">
-      <a:defRPr sz="1800" kern="1200">
-        <a:solidFill>
-          <a:schemeClr val="tx1"/>
-        </a:solidFill>
-        <a:latin typeface="+mn-lt"/>
-        <a:ea typeface="+mn-ea"/>
-        <a:cs typeface="+mn-cs"/>
-      </a:defRPr>
-    </a:lvl2pPr>
-    <a:lvl3pPr marL="914400" algn="l" defTabSz="914400" rtl="0" eaLnBrk="1" latinLnBrk="0" hangingPunct="1">
-      <a:defRPr sz="1800" kern="1200">
-        <a:solidFill>
-          <a:schemeClr val="tx1"/>
-        </a:solidFill>
-        <a:latin typeface="+mn-lt"/>
-        <a:ea typeface="+mn-ea"/>
-        <a:cs typeface="+mn-cs"/>
-      </a:defRPr>
-    </a:lvl3pPr>
-    <a:lvl4pPr marL="1371600" algn="l" defTabSz="914400" rtl="0" eaLnBrk="1" latinLnBrk="0" hangingPunct="1">
-      <a:defRPr sz="1800" kern="1200">
-        <a:solidFill>
-          <a:schemeClr val="tx1"/>
-        </a:solidFill>
-        <a:latin typeface="+mn-lt"/>
-        <a:ea typeface="+mn-ea"/>
-        <a:cs typeface="+mn-cs"/>
-      </a:defRPr>
-    </a:lvl4pPr>
-    <a:lvl5pPr marL="1828800" algn="l" defTabSz="914400" rtl="0" eaLnBrk="1" latinLnBrk="0" hangingPunct="1">
-      <a:defRPr sz="1800" kern="1200">
-        <a:solidFill>
-          <a:schemeClr val="tx1"/>
-        </a:solidFill>
-        <a:latin typeface="+mn-lt"/>
-        <a:ea typeface="+mn-ea"/>
-        <a:cs typeface="+mn-cs"/>
-      </a:defRPr>
-    </a:lvl5pPr>
-    <a:lvl6pPr marL="2286000" algn="l" defTabSz="914400" rtl="0" eaLnBrk="1" latinLnBrk="0" hangingPunct="1">
-      <a:defRPr sz="1800" kern="1200">
-        <a:solidFill>
-          <a:schemeClr val="tx1"/>
-        </a:solidFill>
-        <a:latin typeface="+mn-lt"/>
-        <a:ea typeface="+mn-ea"/>
-        <a:cs typeface="+mn-cs"/>
-      </a:defRPr>
-    </a:lvl6pPr>
-    <a:lvl7pPr marL="2743200" algn="l" defTabSz="914400" rtl="0" eaLnBrk="1" latinLnBrk="0" hangingPunct="1">
-      <a:defRPr sz="1800" kern="1200">
-        <a:solidFill>
-          <a:schemeClr val="tx1"/>
-        </a:solidFill>
-        <a:latin typeface="+mn-lt"/>
-        <a:ea typeface="+mn-ea"/>
-        <a:cs typeface="+mn-cs"/>
-      </a:defRPr>
-    </a:lvl7pPr>
-    <a:lvl8pPr marL="3200400" algn="l" defTabSz="914400" rtl="0" eaLnBrk="1" latinLnBrk="0" hangingPunct="1">
-      <a:defRPr sz="1800" kern="1200">
-        <a:solidFill>
-          <a:schemeClr val="tx1"/>
-        </a:solidFill>
-        <a:latin typeface="+mn-lt"/>
-        <a:ea typeface="+mn-ea"/>
-        <a:cs typeface="+mn-cs"/>
-      </a:defRPr>
-    </a:lvl8pPr>
-    <a:lvl9pPr marL="3657600" algn="l" defTabSz="914400" rtl="0" eaLnBrk="1" latinLnBrk="0" hangingPunct="1">
-      <a:defRPr sz="1800" kern="1200">
-        <a:solidFill>
-          <a:schemeClr val="tx1"/>
-        </a:solidFill>
-        <a:latin typeface="+mn-lt"/>
-        <a:ea typeface="+mn-ea"/>
-        <a:cs typeface="+mn-cs"/>
-      </a:defRPr>
-    </a:lvl9pPr>
-  </p:defaultTextStyle>
-</p:presentation>
-</file>
 
 <file path=ppt/notesMasters/notesMaster1.xml><?xml version="1.0" encoding="utf-8"?>
 <p:notesMaster xmlns:a="http://schemas.openxmlformats.org/drawingml/2006/main" xmlns:r="http://schemas.openxmlformats.org/officeDocument/2006/relationships" xmlns:p="http://schemas.openxmlformats.org/presentationml/2006/main">
@@ -4334,11 +4218,15 @@
             </a:r>
             <a:r>
               <a:rPr lang="pt-BR" dirty="0" smtClean="0"/>
-              <a:t>(@</a:t>
+              <a:t>(</a:t>
+            </a:r>
+            <a:r>
+              <a:rPr lang="pt-BR" dirty="0" smtClean="0"/>
+              <a:t>@</a:t>
             </a:r>
             <a:r>
               <a:rPr lang="pt-BR" dirty="0" err="1" smtClean="0"/>
-              <a:t>DisableOnOs</a:t>
+              <a:t>TestExceptOnOs</a:t>
             </a:r>
             <a:r>
               <a:rPr lang="pt-BR" dirty="0"/>
@@ -4350,7 +4238,11 @@
             <a:pPr lvl="1"/>
             <a:r>
               <a:rPr lang="pt-BR" dirty="0" smtClean="0"/>
-              <a:t>Testes Dinâmicos</a:t>
+              <a:t>Testes </a:t>
+            </a:r>
+            <a:r>
+              <a:rPr lang="pt-BR" dirty="0" smtClean="0"/>
+              <a:t>Dinâmicos</a:t>
             </a:r>
           </a:p>
         </p:txBody>
@@ -5339,22 +5231,7 @@
                   </a:outerShdw>
                 </a:effectLst>
               </a:rPr>
-              <a:t> 5 – </a:t>
-            </a:r>
-            <a:r>
-              <a:rPr lang="pt-BR" dirty="0" smtClean="0">
-                <a:solidFill>
-                  <a:srgbClr val="0070C0"/>
-                </a:solidFill>
-                <a:effectLst>
-                  <a:outerShdw blurRad="38100" dist="38100" dir="2700000" algn="tl">
-                    <a:srgbClr val="000000">
-                      <a:alpha val="43137"/>
-                    </a:srgbClr>
-                  </a:outerShdw>
-                </a:effectLst>
-              </a:rPr>
-              <a:t>Condições</a:t>
+              <a:t> 5 – Pontos de Extensão</a:t>
             </a:r>
             <a:endParaRPr lang="pt-BR" dirty="0">
               <a:solidFill>
@@ -5411,7 +5288,7 @@
             </a:r>
             <a:r>
               <a:rPr lang="pt-BR" sz="2000" i="1" dirty="0" err="1" smtClean="0"/>
-              <a:t>DisabledOnOs</a:t>
+              <a:t>TestExceptionOnOs</a:t>
             </a:r>
             <a:endParaRPr lang="pt-BR" sz="2000" i="1" dirty="0" smtClean="0"/>
           </a:p>
@@ -5421,6 +5298,7 @@
               <a:rPr lang="pt-BR" sz="2000" i="1" dirty="0" smtClean="0"/>
               <a:t>@Benchmark</a:t>
             </a:r>
+            <a:endParaRPr lang="pt-BR" sz="2000" i="1" dirty="0" smtClean="0"/>
           </a:p>
           <a:p>
             <a:pPr marL="457200" lvl="1" indent="0">
@@ -5681,266 +5559,101 @@
         </p:spPr>
         <p:txBody>
           <a:bodyPr>
-            <a:normAutofit lnSpcReduction="10000"/>
+            <a:normAutofit/>
           </a:bodyPr>
           <a:lstStyle/>
           <a:p>
-            <a:r>
-              <a:rPr lang="pt-BR" sz="2800" b="1" i="1" dirty="0" smtClean="0"/>
-              <a:t>@</a:t>
-            </a:r>
-            <a:r>
-              <a:rPr lang="pt-BR" sz="2800" b="1" i="1" dirty="0" err="1" smtClean="0"/>
-              <a:t>TestFactory</a:t>
-            </a:r>
-            <a:endParaRPr lang="pt-BR" sz="2800" b="1" i="1" dirty="0"/>
-          </a:p>
-          <a:p>
-            <a:pPr marL="0" indent="0">
-              <a:buNone/>
-            </a:pPr>
-            <a:r>
-              <a:rPr lang="pt-BR" sz="2800" b="1" i="1" dirty="0"/>
-              <a:t> </a:t>
-            </a:r>
-            <a:r>
-              <a:rPr lang="pt-BR" sz="2800" b="1" i="1" dirty="0" smtClean="0"/>
-              <a:t>   </a:t>
-            </a:r>
-            <a:r>
-              <a:rPr lang="pt-BR" sz="2400" dirty="0" err="1" smtClean="0"/>
-              <a:t>List</a:t>
-            </a:r>
-            <a:r>
-              <a:rPr lang="pt-BR" sz="2400" dirty="0" smtClean="0"/>
-              <a:t>&lt;</a:t>
-            </a:r>
-            <a:r>
-              <a:rPr lang="pt-BR" sz="2400" dirty="0" err="1" smtClean="0"/>
-              <a:t>DynamicTest</a:t>
-            </a:r>
-            <a:r>
-              <a:rPr lang="pt-BR" sz="2400" dirty="0"/>
-              <a:t>&gt; </a:t>
-            </a:r>
-            <a:r>
-              <a:rPr lang="pt-BR" sz="2400" b="1" dirty="0" err="1"/>
-              <a:t>registeredTests</a:t>
-            </a:r>
-            <a:r>
-              <a:rPr lang="pt-BR" sz="2400" b="1" dirty="0"/>
-              <a:t>() {</a:t>
-            </a:r>
-          </a:p>
-          <a:p>
-            <a:pPr marL="457200" lvl="1" indent="0">
-              <a:buNone/>
-            </a:pPr>
-            <a:r>
-              <a:rPr lang="pt-BR" sz="2400" b="1" dirty="0" err="1" smtClean="0"/>
-              <a:t>return</a:t>
-            </a:r>
-            <a:r>
-              <a:rPr lang="pt-BR" sz="2400" b="1" dirty="0" smtClean="0"/>
-              <a:t> </a:t>
-            </a:r>
-            <a:r>
-              <a:rPr lang="pt-BR" sz="2400" b="1" i="1" dirty="0" err="1"/>
-              <a:t>asList</a:t>
-            </a:r>
-            <a:r>
-              <a:rPr lang="pt-BR" sz="2400" b="1" i="1" dirty="0"/>
-              <a:t>(</a:t>
-            </a:r>
-          </a:p>
-          <a:p>
-            <a:pPr marL="457200" lvl="1" indent="0">
-              <a:buNone/>
-            </a:pPr>
-            <a:r>
-              <a:rPr lang="en-US" sz="2400" i="1" dirty="0" smtClean="0"/>
-              <a:t>	</a:t>
-            </a:r>
-            <a:r>
-              <a:rPr lang="en-US" sz="2400" i="1" dirty="0" err="1" smtClean="0"/>
-              <a:t>dynamicTest</a:t>
-            </a:r>
-            <a:r>
-              <a:rPr lang="en-US" sz="2400" i="1" dirty="0"/>
-              <a:t>("Dynamic Test #1", </a:t>
-            </a:r>
-            <a:endParaRPr lang="en-US" sz="2400" i="1" dirty="0" smtClean="0"/>
-          </a:p>
-          <a:p>
-            <a:pPr marL="1828800" lvl="4" indent="0">
-              <a:buNone/>
-            </a:pPr>
-            <a:r>
-              <a:rPr lang="en-US" sz="2100" i="1" dirty="0"/>
-              <a:t>() </a:t>
-            </a:r>
-            <a:r>
-              <a:rPr lang="en-US" sz="2100" i="1" dirty="0"/>
-              <a:t>-&gt; </a:t>
-            </a:r>
-            <a:r>
-              <a:rPr lang="en-US" sz="2100" i="1" dirty="0" err="1"/>
-              <a:t>System.out.println</a:t>
-            </a:r>
-            <a:r>
-              <a:rPr lang="en-US" sz="2100" i="1" dirty="0"/>
-              <a:t>("Hi, this is Dynamic </a:t>
-            </a:r>
-            <a:r>
-              <a:rPr lang="en-US" sz="2100" i="1" dirty="0"/>
-              <a:t>Test #1!")),</a:t>
-            </a:r>
-          </a:p>
-          <a:p>
-            <a:pPr marL="457200" lvl="1" indent="0">
-              <a:buNone/>
-            </a:pPr>
-            <a:r>
-              <a:rPr lang="en-US" sz="2400" i="1" dirty="0"/>
-              <a:t>	</a:t>
-            </a:r>
-            <a:r>
-              <a:rPr lang="pt-BR" sz="2400" i="1" dirty="0" err="1"/>
-              <a:t>dynamicTest</a:t>
-            </a:r>
-            <a:r>
-              <a:rPr lang="pt-BR" sz="2400" i="1" dirty="0"/>
-              <a:t>("</a:t>
-            </a:r>
-            <a:r>
-              <a:rPr lang="pt-BR" sz="2400" i="1" dirty="0" err="1"/>
-              <a:t>Dynamic</a:t>
-            </a:r>
-            <a:r>
-              <a:rPr lang="pt-BR" sz="2400" i="1" dirty="0"/>
-              <a:t> Test #2",</a:t>
-            </a:r>
-          </a:p>
-          <a:p>
-            <a:pPr marL="1828800" lvl="4" indent="0">
-              <a:buNone/>
-            </a:pPr>
-            <a:r>
-              <a:rPr lang="pt-BR" sz="2100" i="1" dirty="0" smtClean="0"/>
-              <a:t>() </a:t>
-            </a:r>
-            <a:r>
-              <a:rPr lang="pt-BR" sz="2100" i="1" dirty="0"/>
-              <a:t>-&gt; </a:t>
-            </a:r>
-            <a:r>
-              <a:rPr lang="pt-BR" sz="2100" i="1" dirty="0" err="1"/>
-              <a:t>fail</a:t>
-            </a:r>
-            <a:r>
-              <a:rPr lang="pt-BR" sz="2100" i="1" dirty="0" smtClean="0"/>
-              <a:t>(“</a:t>
-            </a:r>
-            <a:r>
-              <a:rPr lang="pt-BR" sz="2100" i="1" dirty="0" err="1" smtClean="0"/>
-              <a:t>Dynamic</a:t>
-            </a:r>
-            <a:r>
-              <a:rPr lang="pt-BR" sz="2100" i="1" dirty="0" smtClean="0"/>
-              <a:t> Test #2 </a:t>
-            </a:r>
-            <a:r>
-              <a:rPr lang="pt-BR" sz="2100" i="1" dirty="0" err="1" smtClean="0"/>
-              <a:t>failing</a:t>
-            </a:r>
-            <a:r>
-              <a:rPr lang="pt-BR" sz="2100" i="1" dirty="0" smtClean="0"/>
-              <a:t>!")),</a:t>
-            </a:r>
-            <a:endParaRPr lang="pt-BR" sz="2100" i="1" dirty="0"/>
-          </a:p>
-          <a:p>
-            <a:pPr marL="457200" lvl="1" indent="0">
-              <a:buNone/>
-            </a:pPr>
-            <a:r>
-              <a:rPr lang="en-US" i="1" dirty="0" smtClean="0"/>
-              <a:t>	</a:t>
-            </a:r>
-            <a:r>
-              <a:rPr lang="en-US" sz="2400" i="1" dirty="0" err="1"/>
-              <a:t>dynamicTest</a:t>
-            </a:r>
-            <a:r>
-              <a:rPr lang="en-US" sz="2400" i="1" dirty="0"/>
-              <a:t>("Dynamic Test #2", </a:t>
-            </a:r>
-            <a:endParaRPr lang="en-US" sz="2400" i="1" dirty="0"/>
-          </a:p>
-          <a:p>
-            <a:pPr marL="1828800" lvl="4" indent="0">
-              <a:buNone/>
-            </a:pPr>
-            <a:r>
-              <a:rPr lang="en-US" i="1" dirty="0" smtClean="0"/>
-              <a:t>() </a:t>
-            </a:r>
-            <a:r>
-              <a:rPr lang="en-US" i="1" dirty="0"/>
-              <a:t>-&gt; </a:t>
-            </a:r>
-            <a:r>
-              <a:rPr lang="en-US" sz="2100" i="1" dirty="0" err="1"/>
-              <a:t>System.out.println</a:t>
-            </a:r>
-            <a:r>
-              <a:rPr lang="en-US" sz="2100" i="1" dirty="0"/>
-              <a:t>("Hi, this is Dynamic Test </a:t>
-            </a:r>
-            <a:r>
-              <a:rPr lang="en-US" sz="2100" i="1" dirty="0"/>
-              <a:t>#3!")));</a:t>
-            </a:r>
-            <a:endParaRPr lang="en-US" sz="2100" i="1" dirty="0"/>
-          </a:p>
-          <a:p>
-            <a:pPr marL="457200" lvl="1" indent="0">
-              <a:buNone/>
-            </a:pPr>
-            <a:r>
-              <a:rPr lang="pt-BR" sz="2400" dirty="0"/>
-              <a:t>}</a:t>
-            </a:r>
-            <a:endParaRPr lang="en-US" sz="2400" dirty="0"/>
-          </a:p>
-          <a:p>
-            <a:endParaRPr lang="pt-BR" sz="2800" dirty="0" smtClean="0"/>
-          </a:p>
-          <a:p>
-            <a:r>
-              <a:rPr lang="pt-BR" sz="2800" dirty="0" smtClean="0"/>
-              <a:t>Artigo - </a:t>
-            </a:r>
             <a:r>
               <a:rPr lang="pt-BR" sz="2800" dirty="0" err="1" smtClean="0"/>
               <a:t>JUnit</a:t>
             </a:r>
             <a:r>
               <a:rPr lang="pt-BR" sz="2800" dirty="0" smtClean="0"/>
-              <a:t> </a:t>
+              <a:t> 4: </a:t>
+            </a:r>
+            <a:r>
+              <a:rPr lang="pt-BR" sz="2800" i="1" dirty="0" err="1" smtClean="0"/>
+              <a:t>Runner</a:t>
+            </a:r>
+            <a:r>
+              <a:rPr lang="pt-BR" sz="2800" i="1" dirty="0" smtClean="0"/>
+              <a:t>, @</a:t>
+            </a:r>
+            <a:r>
+              <a:rPr lang="pt-BR" sz="2800" i="1" dirty="0" err="1" smtClean="0"/>
+              <a:t>Rule</a:t>
+            </a:r>
+            <a:r>
+              <a:rPr lang="pt-BR" sz="2800" i="1" dirty="0" smtClean="0"/>
+              <a:t>, @</a:t>
+            </a:r>
+            <a:r>
+              <a:rPr lang="pt-BR" sz="2800" i="1" dirty="0" err="1" smtClean="0"/>
+              <a:t>ClassRule</a:t>
+            </a:r>
+            <a:endParaRPr lang="pt-BR" sz="2800" i="1" dirty="0" smtClean="0"/>
+          </a:p>
+          <a:p>
+            <a:r>
+              <a:rPr lang="pt-BR" sz="2800" dirty="0"/>
+              <a:t>@</a:t>
+            </a:r>
+            <a:r>
+              <a:rPr lang="pt-BR" sz="2800" dirty="0" err="1"/>
+              <a:t>ExtendWith</a:t>
             </a:r>
             <a:r>
               <a:rPr lang="pt-BR" sz="2800" dirty="0" smtClean="0"/>
-              <a:t>4: </a:t>
-            </a:r>
-            <a:r>
-              <a:rPr lang="pt-BR" sz="2800" i="1" dirty="0" smtClean="0"/>
+              <a:t>({Extension1.class</a:t>
+            </a:r>
+            <a:r>
+              <a:rPr lang="pt-BR" sz="2800" dirty="0"/>
+              <a:t>, </a:t>
+            </a:r>
+            <a:r>
+              <a:rPr lang="pt-BR" sz="2800" dirty="0" smtClean="0"/>
+              <a:t>Extension2.class </a:t>
+            </a:r>
+            <a:r>
+              <a:rPr lang="pt-BR" sz="2800" dirty="0"/>
+              <a:t>})</a:t>
+            </a:r>
+          </a:p>
+          <a:p>
+            <a:r>
+              <a:rPr lang="pt-BR" sz="2800" dirty="0" smtClean="0"/>
+              <a:t>Meta-</a:t>
+            </a:r>
+            <a:r>
+              <a:rPr lang="pt-BR" sz="2800" dirty="0" err="1" smtClean="0"/>
+              <a:t>annotation</a:t>
+            </a:r>
+            <a:endParaRPr lang="pt-BR" sz="2800" dirty="0" smtClean="0"/>
+          </a:p>
+          <a:p>
+            <a:pPr lvl="1"/>
+            <a:r>
+              <a:rPr lang="pt-BR" sz="2400" dirty="0" smtClean="0"/>
               <a:t>@</a:t>
             </a:r>
             <a:r>
-              <a:rPr lang="pt-BR" sz="2800" i="1" dirty="0" err="1" smtClean="0"/>
-              <a:t>Theory</a:t>
-            </a:r>
+              <a:rPr lang="pt-BR" sz="2400" dirty="0" err="1" smtClean="0"/>
+              <a:t>IntegrationTest</a:t>
+            </a:r>
+            <a:endParaRPr lang="pt-BR" sz="2400" dirty="0" smtClean="0"/>
+          </a:p>
+          <a:p>
+            <a:pPr lvl="1"/>
+            <a:r>
+              <a:rPr lang="pt-BR" sz="2400" dirty="0" smtClean="0"/>
+              <a:t>@Benchmark</a:t>
+            </a:r>
+            <a:endParaRPr lang="pt-BR" sz="2400" dirty="0"/>
+          </a:p>
+          <a:p>
+            <a:pPr marL="457200" lvl="1" indent="0">
+              <a:buNone/>
+            </a:pPr>
             <a:endParaRPr lang="pt-BR" dirty="0" smtClean="0"/>
           </a:p>
           <a:p>

</xml_diff>

<commit_message>
Implementação de teste para apresentação - new String(hash)
</commit_message>
<xml_diff>
--- a/CAP385-00-Presentations/03-JUnit 5 Arquitetura e Pontos de Extensão/03-JUnit 5 - Arquitetura.pptx
+++ b/CAP385-00-Presentations/03-JUnit 5 Arquitetura e Pontos de Extensão/03-JUnit 5 - Arquitetura.pptx
@@ -4334,15 +4334,11 @@
             </a:r>
             <a:r>
               <a:rPr lang="pt-BR" dirty="0" smtClean="0"/>
-              <a:t>(</a:t>
-            </a:r>
-            <a:r>
-              <a:rPr lang="pt-BR" dirty="0" smtClean="0"/>
-              <a:t>@</a:t>
+              <a:t>(@</a:t>
             </a:r>
             <a:r>
               <a:rPr lang="pt-BR" dirty="0" err="1" smtClean="0"/>
-              <a:t>TestExceptOnOs</a:t>
+              <a:t>DisableOnOs</a:t>
             </a:r>
             <a:r>
               <a:rPr lang="pt-BR" dirty="0"/>
@@ -4354,11 +4350,7 @@
             <a:pPr lvl="1"/>
             <a:r>
               <a:rPr lang="pt-BR" dirty="0" smtClean="0"/>
-              <a:t>Testes </a:t>
-            </a:r>
-            <a:r>
-              <a:rPr lang="pt-BR" dirty="0" smtClean="0"/>
-              <a:t>Dinâmicos</a:t>
+              <a:t>Testes Dinâmicos</a:t>
             </a:r>
           </a:p>
         </p:txBody>
@@ -5347,7 +5339,22 @@
                   </a:outerShdw>
                 </a:effectLst>
               </a:rPr>
-              <a:t> 5 – Pontos de Extensão</a:t>
+              <a:t> 5 – </a:t>
+            </a:r>
+            <a:r>
+              <a:rPr lang="pt-BR" dirty="0" smtClean="0">
+                <a:solidFill>
+                  <a:srgbClr val="0070C0"/>
+                </a:solidFill>
+                <a:effectLst>
+                  <a:outerShdw blurRad="38100" dist="38100" dir="2700000" algn="tl">
+                    <a:srgbClr val="000000">
+                      <a:alpha val="43137"/>
+                    </a:srgbClr>
+                  </a:outerShdw>
+                </a:effectLst>
+              </a:rPr>
+              <a:t>Condições</a:t>
             </a:r>
             <a:endParaRPr lang="pt-BR" dirty="0">
               <a:solidFill>
@@ -5404,7 +5411,7 @@
             </a:r>
             <a:r>
               <a:rPr lang="pt-BR" sz="2000" i="1" dirty="0" err="1" smtClean="0"/>
-              <a:t>TestExceptionOnOs</a:t>
+              <a:t>DisabledOnOs</a:t>
             </a:r>
             <a:endParaRPr lang="pt-BR" sz="2000" i="1" dirty="0" smtClean="0"/>
           </a:p>
@@ -5414,7 +5421,6 @@
               <a:rPr lang="pt-BR" sz="2000" i="1" dirty="0" smtClean="0"/>
               <a:t>@Benchmark</a:t>
             </a:r>
-            <a:endParaRPr lang="pt-BR" sz="2000" i="1" dirty="0" smtClean="0"/>
           </a:p>
           <a:p>
             <a:pPr marL="457200" lvl="1" indent="0">

</xml_diff>

<commit_message>
Classe para exemplo de DynamicTest e slide pronto.
</commit_message>
<xml_diff>
--- a/CAP385-00-Presentations/03-JUnit 5 Arquitetura e Pontos de Extensão/03-JUnit 5 - Arquitetura.pptx
+++ b/CAP385-00-Presentations/03-JUnit 5 Arquitetura e Pontos de Extensão/03-JUnit 5 - Arquitetura.pptx
@@ -5681,101 +5681,266 @@
         </p:spPr>
         <p:txBody>
           <a:bodyPr>
-            <a:normAutofit/>
+            <a:normAutofit lnSpcReduction="10000"/>
           </a:bodyPr>
           <a:lstStyle/>
           <a:p>
+            <a:r>
+              <a:rPr lang="pt-BR" sz="2800" b="1" i="1" dirty="0" smtClean="0"/>
+              <a:t>@</a:t>
+            </a:r>
+            <a:r>
+              <a:rPr lang="pt-BR" sz="2800" b="1" i="1" dirty="0" err="1" smtClean="0"/>
+              <a:t>TestFactory</a:t>
+            </a:r>
+            <a:endParaRPr lang="pt-BR" sz="2800" b="1" i="1" dirty="0"/>
+          </a:p>
+          <a:p>
+            <a:pPr marL="0" indent="0">
+              <a:buNone/>
+            </a:pPr>
+            <a:r>
+              <a:rPr lang="pt-BR" sz="2800" b="1" i="1" dirty="0"/>
+              <a:t> </a:t>
+            </a:r>
+            <a:r>
+              <a:rPr lang="pt-BR" sz="2800" b="1" i="1" dirty="0" smtClean="0"/>
+              <a:t>   </a:t>
+            </a:r>
+            <a:r>
+              <a:rPr lang="pt-BR" sz="2400" dirty="0" err="1" smtClean="0"/>
+              <a:t>List</a:t>
+            </a:r>
+            <a:r>
+              <a:rPr lang="pt-BR" sz="2400" dirty="0" smtClean="0"/>
+              <a:t>&lt;</a:t>
+            </a:r>
+            <a:r>
+              <a:rPr lang="pt-BR" sz="2400" dirty="0" err="1" smtClean="0"/>
+              <a:t>DynamicTest</a:t>
+            </a:r>
+            <a:r>
+              <a:rPr lang="pt-BR" sz="2400" dirty="0"/>
+              <a:t>&gt; </a:t>
+            </a:r>
+            <a:r>
+              <a:rPr lang="pt-BR" sz="2400" b="1" dirty="0" err="1"/>
+              <a:t>registeredTests</a:t>
+            </a:r>
+            <a:r>
+              <a:rPr lang="pt-BR" sz="2400" b="1" dirty="0"/>
+              <a:t>() {</a:t>
+            </a:r>
+          </a:p>
+          <a:p>
+            <a:pPr marL="457200" lvl="1" indent="0">
+              <a:buNone/>
+            </a:pPr>
+            <a:r>
+              <a:rPr lang="pt-BR" sz="2400" b="1" dirty="0" err="1" smtClean="0"/>
+              <a:t>return</a:t>
+            </a:r>
+            <a:r>
+              <a:rPr lang="pt-BR" sz="2400" b="1" dirty="0" smtClean="0"/>
+              <a:t> </a:t>
+            </a:r>
+            <a:r>
+              <a:rPr lang="pt-BR" sz="2400" b="1" i="1" dirty="0" err="1"/>
+              <a:t>asList</a:t>
+            </a:r>
+            <a:r>
+              <a:rPr lang="pt-BR" sz="2400" b="1" i="1" dirty="0"/>
+              <a:t>(</a:t>
+            </a:r>
+          </a:p>
+          <a:p>
+            <a:pPr marL="457200" lvl="1" indent="0">
+              <a:buNone/>
+            </a:pPr>
+            <a:r>
+              <a:rPr lang="en-US" sz="2400" i="1" dirty="0" smtClean="0"/>
+              <a:t>	</a:t>
+            </a:r>
+            <a:r>
+              <a:rPr lang="en-US" sz="2400" i="1" dirty="0" err="1" smtClean="0"/>
+              <a:t>dynamicTest</a:t>
+            </a:r>
+            <a:r>
+              <a:rPr lang="en-US" sz="2400" i="1" dirty="0"/>
+              <a:t>("Dynamic Test #1", </a:t>
+            </a:r>
+            <a:endParaRPr lang="en-US" sz="2400" i="1" dirty="0" smtClean="0"/>
+          </a:p>
+          <a:p>
+            <a:pPr marL="1828800" lvl="4" indent="0">
+              <a:buNone/>
+            </a:pPr>
+            <a:r>
+              <a:rPr lang="en-US" sz="2100" i="1" dirty="0"/>
+              <a:t>() </a:t>
+            </a:r>
+            <a:r>
+              <a:rPr lang="en-US" sz="2100" i="1" dirty="0"/>
+              <a:t>-&gt; </a:t>
+            </a:r>
+            <a:r>
+              <a:rPr lang="en-US" sz="2100" i="1" dirty="0" err="1"/>
+              <a:t>System.out.println</a:t>
+            </a:r>
+            <a:r>
+              <a:rPr lang="en-US" sz="2100" i="1" dirty="0"/>
+              <a:t>("Hi, this is Dynamic </a:t>
+            </a:r>
+            <a:r>
+              <a:rPr lang="en-US" sz="2100" i="1" dirty="0"/>
+              <a:t>Test #1!")),</a:t>
+            </a:r>
+          </a:p>
+          <a:p>
+            <a:pPr marL="457200" lvl="1" indent="0">
+              <a:buNone/>
+            </a:pPr>
+            <a:r>
+              <a:rPr lang="en-US" sz="2400" i="1" dirty="0"/>
+              <a:t>	</a:t>
+            </a:r>
+            <a:r>
+              <a:rPr lang="pt-BR" sz="2400" i="1" dirty="0" err="1"/>
+              <a:t>dynamicTest</a:t>
+            </a:r>
+            <a:r>
+              <a:rPr lang="pt-BR" sz="2400" i="1" dirty="0"/>
+              <a:t>("</a:t>
+            </a:r>
+            <a:r>
+              <a:rPr lang="pt-BR" sz="2400" i="1" dirty="0" err="1"/>
+              <a:t>Dynamic</a:t>
+            </a:r>
+            <a:r>
+              <a:rPr lang="pt-BR" sz="2400" i="1" dirty="0"/>
+              <a:t> Test #2",</a:t>
+            </a:r>
+          </a:p>
+          <a:p>
+            <a:pPr marL="1828800" lvl="4" indent="0">
+              <a:buNone/>
+            </a:pPr>
+            <a:r>
+              <a:rPr lang="pt-BR" sz="2100" i="1" dirty="0" smtClean="0"/>
+              <a:t>() </a:t>
+            </a:r>
+            <a:r>
+              <a:rPr lang="pt-BR" sz="2100" i="1" dirty="0"/>
+              <a:t>-&gt; </a:t>
+            </a:r>
+            <a:r>
+              <a:rPr lang="pt-BR" sz="2100" i="1" dirty="0" err="1"/>
+              <a:t>fail</a:t>
+            </a:r>
+            <a:r>
+              <a:rPr lang="pt-BR" sz="2100" i="1" dirty="0" smtClean="0"/>
+              <a:t>(“</a:t>
+            </a:r>
+            <a:r>
+              <a:rPr lang="pt-BR" sz="2100" i="1" dirty="0" err="1" smtClean="0"/>
+              <a:t>Dynamic</a:t>
+            </a:r>
+            <a:r>
+              <a:rPr lang="pt-BR" sz="2100" i="1" dirty="0" smtClean="0"/>
+              <a:t> Test #2 </a:t>
+            </a:r>
+            <a:r>
+              <a:rPr lang="pt-BR" sz="2100" i="1" dirty="0" err="1" smtClean="0"/>
+              <a:t>failing</a:t>
+            </a:r>
+            <a:r>
+              <a:rPr lang="pt-BR" sz="2100" i="1" dirty="0" smtClean="0"/>
+              <a:t>!")),</a:t>
+            </a:r>
+            <a:endParaRPr lang="pt-BR" sz="2100" i="1" dirty="0"/>
+          </a:p>
+          <a:p>
+            <a:pPr marL="457200" lvl="1" indent="0">
+              <a:buNone/>
+            </a:pPr>
+            <a:r>
+              <a:rPr lang="en-US" i="1" dirty="0" smtClean="0"/>
+              <a:t>	</a:t>
+            </a:r>
+            <a:r>
+              <a:rPr lang="en-US" sz="2400" i="1" dirty="0" err="1"/>
+              <a:t>dynamicTest</a:t>
+            </a:r>
+            <a:r>
+              <a:rPr lang="en-US" sz="2400" i="1" dirty="0"/>
+              <a:t>("Dynamic Test #2", </a:t>
+            </a:r>
+            <a:endParaRPr lang="en-US" sz="2400" i="1" dirty="0"/>
+          </a:p>
+          <a:p>
+            <a:pPr marL="1828800" lvl="4" indent="0">
+              <a:buNone/>
+            </a:pPr>
+            <a:r>
+              <a:rPr lang="en-US" i="1" dirty="0" smtClean="0"/>
+              <a:t>() </a:t>
+            </a:r>
+            <a:r>
+              <a:rPr lang="en-US" i="1" dirty="0"/>
+              <a:t>-&gt; </a:t>
+            </a:r>
+            <a:r>
+              <a:rPr lang="en-US" sz="2100" i="1" dirty="0" err="1"/>
+              <a:t>System.out.println</a:t>
+            </a:r>
+            <a:r>
+              <a:rPr lang="en-US" sz="2100" i="1" dirty="0"/>
+              <a:t>("Hi, this is Dynamic Test </a:t>
+            </a:r>
+            <a:r>
+              <a:rPr lang="en-US" sz="2100" i="1" dirty="0"/>
+              <a:t>#3!")));</a:t>
+            </a:r>
+            <a:endParaRPr lang="en-US" sz="2100" i="1" dirty="0"/>
+          </a:p>
+          <a:p>
+            <a:pPr marL="457200" lvl="1" indent="0">
+              <a:buNone/>
+            </a:pPr>
+            <a:r>
+              <a:rPr lang="pt-BR" sz="2400" dirty="0"/>
+              <a:t>}</a:t>
+            </a:r>
+            <a:endParaRPr lang="en-US" sz="2400" dirty="0"/>
+          </a:p>
+          <a:p>
+            <a:endParaRPr lang="pt-BR" sz="2800" dirty="0" smtClean="0"/>
+          </a:p>
+          <a:p>
+            <a:r>
+              <a:rPr lang="pt-BR" sz="2800" dirty="0" smtClean="0"/>
+              <a:t>Artigo - </a:t>
+            </a:r>
             <a:r>
               <a:rPr lang="pt-BR" sz="2800" dirty="0" err="1" smtClean="0"/>
               <a:t>JUnit</a:t>
             </a:r>
             <a:r>
               <a:rPr lang="pt-BR" sz="2800" dirty="0" smtClean="0"/>
-              <a:t> 4: </a:t>
+              <a:t> </a:t>
+            </a:r>
+            <a:r>
+              <a:rPr lang="pt-BR" sz="2800" dirty="0" smtClean="0"/>
+              <a:t>4: </a:t>
+            </a:r>
+            <a:r>
+              <a:rPr lang="pt-BR" sz="2800" i="1" dirty="0" smtClean="0"/>
+              <a:t>@</a:t>
             </a:r>
             <a:r>
               <a:rPr lang="pt-BR" sz="2800" i="1" dirty="0" err="1" smtClean="0"/>
-              <a:t>Runner</a:t>
-            </a:r>
-            <a:r>
-              <a:rPr lang="pt-BR" sz="2800" i="1" dirty="0" smtClean="0"/>
-              <a:t>, @</a:t>
-            </a:r>
-            <a:r>
-              <a:rPr lang="pt-BR" sz="2800" i="1" dirty="0" err="1" smtClean="0"/>
-              <a:t>Rule</a:t>
-            </a:r>
-            <a:r>
-              <a:rPr lang="pt-BR" sz="2800" i="1" dirty="0" smtClean="0"/>
-              <a:t>, @</a:t>
-            </a:r>
-            <a:r>
-              <a:rPr lang="pt-BR" sz="2800" i="1" dirty="0" err="1" smtClean="0"/>
-              <a:t>ClassRule</a:t>
-            </a:r>
-            <a:endParaRPr lang="pt-BR" sz="2800" i="1" dirty="0" smtClean="0"/>
-          </a:p>
-          <a:p>
-            <a:r>
-              <a:rPr lang="pt-BR" sz="2800" dirty="0"/>
-              <a:t>@</a:t>
-            </a:r>
-            <a:r>
-              <a:rPr lang="pt-BR" sz="2800" dirty="0" err="1"/>
-              <a:t>ExtendWith</a:t>
-            </a:r>
-            <a:r>
-              <a:rPr lang="pt-BR" sz="2800" dirty="0" smtClean="0"/>
-              <a:t>({Extension1.class</a:t>
-            </a:r>
-            <a:r>
-              <a:rPr lang="pt-BR" sz="2800" dirty="0"/>
-              <a:t>, </a:t>
-            </a:r>
-            <a:r>
-              <a:rPr lang="pt-BR" sz="2800" dirty="0" smtClean="0"/>
-              <a:t>Extension2.class </a:t>
-            </a:r>
-            <a:r>
-              <a:rPr lang="pt-BR" sz="2800" dirty="0"/>
-              <a:t>})</a:t>
-            </a:r>
-          </a:p>
-          <a:p>
-            <a:r>
-              <a:rPr lang="pt-BR" sz="2800" dirty="0" smtClean="0"/>
-              <a:t>Meta-</a:t>
-            </a:r>
-            <a:r>
-              <a:rPr lang="pt-BR" sz="2800" dirty="0" err="1" smtClean="0"/>
-              <a:t>annotation</a:t>
-            </a:r>
-            <a:endParaRPr lang="pt-BR" sz="2800" dirty="0" smtClean="0"/>
-          </a:p>
-          <a:p>
-            <a:pPr lvl="1"/>
-            <a:r>
-              <a:rPr lang="pt-BR" sz="2400" dirty="0" smtClean="0"/>
-              <a:t>@</a:t>
-            </a:r>
-            <a:r>
-              <a:rPr lang="pt-BR" sz="2400" dirty="0" err="1" smtClean="0"/>
-              <a:t>IntegrationTest</a:t>
-            </a:r>
-            <a:endParaRPr lang="pt-BR" sz="2400" dirty="0" smtClean="0"/>
-          </a:p>
-          <a:p>
-            <a:pPr lvl="1"/>
-            <a:r>
-              <a:rPr lang="pt-BR" sz="2400" dirty="0" smtClean="0"/>
-              <a:t>@Benchmark</a:t>
-            </a:r>
-            <a:endParaRPr lang="pt-BR" sz="2400" dirty="0"/>
-          </a:p>
-          <a:p>
-            <a:pPr marL="457200" lvl="1" indent="0">
-              <a:buNone/>
-            </a:pPr>
+              <a:t>Theory</a:t>
+            </a:r>
             <a:endParaRPr lang="pt-BR" dirty="0" smtClean="0"/>
           </a:p>
           <a:p>

</xml_diff>